<commit_message>
Updating example 1 template
</commit_message>
<xml_diff>
--- a/Presentations/Part 2.pptx
+++ b/Presentations/Part 2.pptx
@@ -5,10 +5,10 @@
     <p:sldMasterId id="2147483648" r:id="rId1"/>
   </p:sldMasterIdLst>
   <p:notesMasterIdLst>
-    <p:notesMasterId r:id="rId12"/>
+    <p:notesMasterId r:id="rId8"/>
   </p:notesMasterIdLst>
   <p:handoutMasterIdLst>
-    <p:handoutMasterId r:id="rId13"/>
+    <p:handoutMasterId r:id="rId9"/>
   </p:handoutMasterIdLst>
   <p:sldIdLst>
     <p:sldId id="279" r:id="rId2"/>
@@ -17,10 +17,6 @@
     <p:sldId id="287" r:id="rId5"/>
     <p:sldId id="281" r:id="rId6"/>
     <p:sldId id="289" r:id="rId7"/>
-    <p:sldId id="283" r:id="rId8"/>
-    <p:sldId id="284" r:id="rId9"/>
-    <p:sldId id="285" r:id="rId10"/>
-    <p:sldId id="286" r:id="rId11"/>
   </p:sldIdLst>
   <p:sldSz cx="12192000" cy="6858000"/>
   <p:notesSz cx="6858000" cy="9144000"/>
@@ -223,7 +219,7 @@
           <a:p>
             <a:fld id="{C12237CC-B169-4E15-9D02-8819C0D67E83}" type="datetimeFigureOut">
               <a:rPr lang="en-US" smtClean="0"/>
-              <a:t>3/10/2019</a:t>
+              <a:t>4/2/2019</a:t>
             </a:fld>
             <a:endParaRPr lang="en-US" dirty="0"/>
           </a:p>
@@ -388,7 +384,7 @@
           <a:p>
             <a:fld id="{914CFCC5-8359-472B-ADB2-EAE685881981}" type="datetimeFigureOut">
               <a:rPr lang="en-US" smtClean="0"/>
-              <a:t>3/10/2019</a:t>
+              <a:t>4/2/2019</a:t>
             </a:fld>
             <a:endParaRPr lang="en-US" dirty="0"/>
           </a:p>
@@ -3458,270 +3454,6 @@
 </p:sld>
 </file>
 
-<file path=ppt/slides/slide10.xml><?xml version="1.0" encoding="utf-8"?>
-<p:sld xmlns:a="http://schemas.openxmlformats.org/drawingml/2006/main" xmlns:r="http://schemas.openxmlformats.org/officeDocument/2006/relationships" xmlns:p="http://schemas.openxmlformats.org/presentationml/2006/main">
-  <p:cSld>
-    <p:spTree>
-      <p:nvGrpSpPr>
-        <p:cNvPr id="1" name=""/>
-        <p:cNvGrpSpPr/>
-        <p:nvPr/>
-      </p:nvGrpSpPr>
-      <p:grpSpPr>
-        <a:xfrm>
-          <a:off x="0" y="0"/>
-          <a:ext cx="0" cy="0"/>
-          <a:chOff x="0" y="0"/>
-          <a:chExt cx="0" cy="0"/>
-        </a:xfrm>
-      </p:grpSpPr>
-      <p:sp>
-        <p:nvSpPr>
-          <p:cNvPr id="2" name="Title 1">
-            <a:extLst>
-              <a:ext uri="{FF2B5EF4-FFF2-40B4-BE49-F238E27FC236}">
-                <a16:creationId xmlns:a16="http://schemas.microsoft.com/office/drawing/2014/main" id="{E2FD4394-7C42-475E-9B6F-FB988223D7F7}"/>
-              </a:ext>
-            </a:extLst>
-          </p:cNvPr>
-          <p:cNvSpPr>
-            <a:spLocks noGrp="1"/>
-          </p:cNvSpPr>
-          <p:nvPr>
-            <p:ph type="title"/>
-          </p:nvPr>
-        </p:nvSpPr>
-        <p:spPr/>
-        <p:txBody>
-          <a:bodyPr/>
-          <a:lstStyle/>
-          <a:p>
-            <a:r>
-              <a:rPr lang="en-US" dirty="0"/>
-              <a:t>Simulate a Virtual Trial </a:t>
-            </a:r>
-          </a:p>
-        </p:txBody>
-      </p:sp>
-      <p:sp>
-        <p:nvSpPr>
-          <p:cNvPr id="3" name="Content Placeholder 2">
-            <a:extLst>
-              <a:ext uri="{FF2B5EF4-FFF2-40B4-BE49-F238E27FC236}">
-                <a16:creationId xmlns:a16="http://schemas.microsoft.com/office/drawing/2014/main" id="{A07C58D4-462D-4747-9EA8-0D89AC4C41EA}"/>
-              </a:ext>
-            </a:extLst>
-          </p:cNvPr>
-          <p:cNvSpPr>
-            <a:spLocks noGrp="1"/>
-          </p:cNvSpPr>
-          <p:nvPr>
-            <p:ph idx="1"/>
-          </p:nvPr>
-        </p:nvSpPr>
-        <p:spPr/>
-        <p:txBody>
-          <a:bodyPr/>
-          <a:lstStyle/>
-          <a:p>
-            <a:r>
-              <a:rPr lang="en-US" sz="3100" dirty="0"/>
-              <a:t>What would a function look like to simulate a single virtual trial?</a:t>
-            </a:r>
-          </a:p>
-          <a:p>
-            <a:pPr marL="457200" lvl="1" indent="0">
-              <a:buNone/>
-            </a:pPr>
-            <a:r>
-              <a:rPr lang="en-US" sz="2600" b="1" dirty="0"/>
-              <a:t>Step 1</a:t>
-            </a:r>
-            <a:r>
-              <a:rPr lang="en-US" sz="2600" dirty="0"/>
-              <a:t>: Simulate patient arrival time</a:t>
-            </a:r>
-          </a:p>
-          <a:p>
-            <a:pPr marL="457200" lvl="1" indent="0">
-              <a:buNone/>
-            </a:pPr>
-            <a:r>
-              <a:rPr lang="en-US" sz="2600" b="1" dirty="0"/>
-              <a:t>Step 2</a:t>
-            </a:r>
-            <a:r>
-              <a:rPr lang="en-US" sz="2600" dirty="0"/>
-              <a:t>: Get the treatment assignment </a:t>
-            </a:r>
-          </a:p>
-          <a:p>
-            <a:pPr marL="457200" lvl="1" indent="0">
-              <a:buNone/>
-            </a:pPr>
-            <a:r>
-              <a:rPr lang="en-US" sz="2600" b="1" dirty="0"/>
-              <a:t>Step 3</a:t>
-            </a:r>
-            <a:r>
-              <a:rPr lang="en-US" sz="2600" dirty="0"/>
-              <a:t>: Simulate the patient outcome based on the treatment received, which is observed 1 month after arriving in the trial </a:t>
-            </a:r>
-          </a:p>
-          <a:p>
-            <a:pPr marL="457200" lvl="1" indent="0">
-              <a:buNone/>
-            </a:pPr>
-            <a:r>
-              <a:rPr lang="en-US" sz="2600" dirty="0"/>
-              <a:t>Repeat Steps 2-3 for each patient</a:t>
-            </a:r>
-          </a:p>
-          <a:p>
-            <a:pPr marL="457200" lvl="1" indent="0">
-              <a:buNone/>
-            </a:pPr>
-            <a:r>
-              <a:rPr lang="en-US" sz="2600" dirty="0"/>
-              <a:t>After all outcomes are observed</a:t>
-            </a:r>
-          </a:p>
-          <a:p>
-            <a:pPr marL="457200" lvl="1" indent="0">
-              <a:buNone/>
-            </a:pPr>
-            <a:r>
-              <a:rPr lang="en-US" sz="2600" b="1" dirty="0"/>
-              <a:t>Step 4: </a:t>
-            </a:r>
-            <a:r>
-              <a:rPr lang="en-US" sz="2600" dirty="0"/>
-              <a:t>Analyze the data </a:t>
-            </a:r>
-          </a:p>
-          <a:p>
-            <a:pPr marL="457200" lvl="1" indent="0">
-              <a:buNone/>
-            </a:pPr>
-            <a:r>
-              <a:rPr lang="en-US" sz="2600" b="1" dirty="0"/>
-              <a:t>Step 5</a:t>
-            </a:r>
-            <a:r>
-              <a:rPr lang="en-US" sz="2600" dirty="0"/>
-              <a:t>: Make a decision based on analysis</a:t>
-            </a:r>
-          </a:p>
-          <a:p>
-            <a:pPr marL="457200" lvl="1" indent="0">
-              <a:buNone/>
-            </a:pPr>
-            <a:endParaRPr lang="en-US" sz="1400" dirty="0"/>
-          </a:p>
-          <a:p>
-            <a:endParaRPr lang="en-US" dirty="0"/>
-          </a:p>
-        </p:txBody>
-      </p:sp>
-      <p:sp>
-        <p:nvSpPr>
-          <p:cNvPr id="4" name="Footer Placeholder 3">
-            <a:extLst>
-              <a:ext uri="{FF2B5EF4-FFF2-40B4-BE49-F238E27FC236}">
-                <a16:creationId xmlns:a16="http://schemas.microsoft.com/office/drawing/2014/main" id="{6C21FD65-7D0E-46DE-84F6-8E2F5CA673A0}"/>
-              </a:ext>
-            </a:extLst>
-          </p:cNvPr>
-          <p:cNvSpPr>
-            <a:spLocks noGrp="1"/>
-          </p:cNvSpPr>
-          <p:nvPr>
-            <p:ph type="ftr" sz="quarter" idx="11"/>
-          </p:nvPr>
-        </p:nvSpPr>
-        <p:spPr/>
-        <p:txBody>
-          <a:bodyPr/>
-          <a:lstStyle/>
-          <a:p>
-            <a:r>
-              <a:rPr lang="en-US"/>
-              <a:t>ASA Biopharmaceutical Section</a:t>
-            </a:r>
-            <a:endParaRPr lang="en-US" dirty="0"/>
-          </a:p>
-        </p:txBody>
-      </p:sp>
-      <p:sp>
-        <p:nvSpPr>
-          <p:cNvPr id="5" name="Slide Number Placeholder 4">
-            <a:extLst>
-              <a:ext uri="{FF2B5EF4-FFF2-40B4-BE49-F238E27FC236}">
-                <a16:creationId xmlns:a16="http://schemas.microsoft.com/office/drawing/2014/main" id="{08A89A62-E4B1-4D11-A836-4F6BE4C758E5}"/>
-              </a:ext>
-            </a:extLst>
-          </p:cNvPr>
-          <p:cNvSpPr>
-            <a:spLocks noGrp="1"/>
-          </p:cNvSpPr>
-          <p:nvPr>
-            <p:ph type="sldNum" sz="quarter" idx="12"/>
-          </p:nvPr>
-        </p:nvSpPr>
-        <p:spPr/>
-        <p:txBody>
-          <a:bodyPr/>
-          <a:lstStyle/>
-          <a:p>
-            <a:fld id="{BFC1F633-5D42-481B-83F9-D18A18F653A2}" type="slidenum">
-              <a:rPr lang="en-US" smtClean="0"/>
-              <a:t>10</a:t>
-            </a:fld>
-            <a:endParaRPr lang="en-US" dirty="0"/>
-          </a:p>
-        </p:txBody>
-      </p:sp>
-      <p:sp>
-        <p:nvSpPr>
-          <p:cNvPr id="6" name="Date Placeholder 5">
-            <a:extLst>
-              <a:ext uri="{FF2B5EF4-FFF2-40B4-BE49-F238E27FC236}">
-                <a16:creationId xmlns:a16="http://schemas.microsoft.com/office/drawing/2014/main" id="{EE1F86EE-9D43-4FD6-BB59-C628F2992EFA}"/>
-              </a:ext>
-            </a:extLst>
-          </p:cNvPr>
-          <p:cNvSpPr>
-            <a:spLocks noGrp="1"/>
-          </p:cNvSpPr>
-          <p:nvPr>
-            <p:ph type="dt" sz="half" idx="10"/>
-          </p:nvPr>
-        </p:nvSpPr>
-        <p:spPr/>
-        <p:txBody>
-          <a:bodyPr/>
-          <a:lstStyle/>
-          <a:p>
-            <a:r>
-              <a:rPr lang="en-US" dirty="0"/>
-              <a:t>Simulating Adaptive Clinical Trials Part 2 - J. Kyle Wathen</a:t>
-            </a:r>
-          </a:p>
-        </p:txBody>
-      </p:sp>
-    </p:spTree>
-    <p:extLst>
-      <p:ext uri="{BB962C8B-B14F-4D97-AF65-F5344CB8AC3E}">
-        <p14:creationId xmlns:p14="http://schemas.microsoft.com/office/powerpoint/2010/main" val="1072061811"/>
-      </p:ext>
-    </p:extLst>
-  </p:cSld>
-  <p:clrMapOvr>
-    <a:masterClrMapping/>
-  </p:clrMapOvr>
-</p:sld>
-</file>
-
 <file path=ppt/slides/slide2.xml><?xml version="1.0" encoding="utf-8"?>
 <p:sld xmlns:a="http://schemas.openxmlformats.org/drawingml/2006/main" xmlns:r="http://schemas.openxmlformats.org/officeDocument/2006/relationships" xmlns:p="http://schemas.openxmlformats.org/presentationml/2006/main">
   <p:cSld>
@@ -3806,7 +3538,9 @@
         </p:nvSpPr>
         <p:spPr/>
         <p:txBody>
-          <a:bodyPr/>
+          <a:bodyPr>
+            <a:normAutofit lnSpcReduction="10000"/>
+          </a:bodyPr>
           <a:lstStyle/>
           <a:p>
             <a:r>
@@ -4581,7 +4315,9 @@
           </a:xfrm>
         </p:spPr>
         <p:txBody>
-          <a:bodyPr/>
+          <a:bodyPr>
+            <a:normAutofit lnSpcReduction="10000"/>
+          </a:bodyPr>
           <a:lstStyle/>
           <a:p>
             <a:r>
@@ -5112,656 +4848,6 @@
     <p:extLst>
       <p:ext uri="{BB962C8B-B14F-4D97-AF65-F5344CB8AC3E}">
         <p14:creationId xmlns:p14="http://schemas.microsoft.com/office/powerpoint/2010/main" val="1546902884"/>
-      </p:ext>
-    </p:extLst>
-  </p:cSld>
-  <p:clrMapOvr>
-    <a:masterClrMapping/>
-  </p:clrMapOvr>
-</p:sld>
-</file>
-
-<file path=ppt/slides/slide7.xml><?xml version="1.0" encoding="utf-8"?>
-<p:sld xmlns:a="http://schemas.openxmlformats.org/drawingml/2006/main" xmlns:r="http://schemas.openxmlformats.org/officeDocument/2006/relationships" xmlns:p="http://schemas.openxmlformats.org/presentationml/2006/main">
-  <p:cSld>
-    <p:spTree>
-      <p:nvGrpSpPr>
-        <p:cNvPr id="1" name=""/>
-        <p:cNvGrpSpPr/>
-        <p:nvPr/>
-      </p:nvGrpSpPr>
-      <p:grpSpPr>
-        <a:xfrm>
-          <a:off x="0" y="0"/>
-          <a:ext cx="0" cy="0"/>
-          <a:chOff x="0" y="0"/>
-          <a:chExt cx="0" cy="0"/>
-        </a:xfrm>
-      </p:grpSpPr>
-      <p:sp>
-        <p:nvSpPr>
-          <p:cNvPr id="2" name="Title 1">
-            <a:extLst>
-              <a:ext uri="{FF2B5EF4-FFF2-40B4-BE49-F238E27FC236}">
-                <a16:creationId xmlns:a16="http://schemas.microsoft.com/office/drawing/2014/main" id="{291327C9-0691-4E71-9105-A1A6F566A88F}"/>
-              </a:ext>
-            </a:extLst>
-          </p:cNvPr>
-          <p:cNvSpPr>
-            <a:spLocks noGrp="1"/>
-          </p:cNvSpPr>
-          <p:nvPr>
-            <p:ph type="title"/>
-          </p:nvPr>
-        </p:nvSpPr>
-        <p:spPr/>
-        <p:txBody>
-          <a:bodyPr/>
-          <a:lstStyle/>
-          <a:p>
-            <a:r>
-              <a:rPr lang="en-US" dirty="0"/>
-              <a:t>Define Tasks</a:t>
-            </a:r>
-          </a:p>
-        </p:txBody>
-      </p:sp>
-      <p:sp>
-        <p:nvSpPr>
-          <p:cNvPr id="3" name="Content Placeholder 2">
-            <a:extLst>
-              <a:ext uri="{FF2B5EF4-FFF2-40B4-BE49-F238E27FC236}">
-                <a16:creationId xmlns:a16="http://schemas.microsoft.com/office/drawing/2014/main" id="{02109535-B259-4F48-8166-5095ECAD5C59}"/>
-              </a:ext>
-            </a:extLst>
-          </p:cNvPr>
-          <p:cNvSpPr>
-            <a:spLocks noGrp="1"/>
-          </p:cNvSpPr>
-          <p:nvPr>
-            <p:ph idx="1"/>
-          </p:nvPr>
-        </p:nvSpPr>
-        <p:spPr/>
-        <p:txBody>
-          <a:bodyPr/>
-          <a:lstStyle/>
-          <a:p>
-            <a:r>
-              <a:rPr lang="en-US" dirty="0"/>
-              <a:t>What tasks are necessary to simulate Example 1?</a:t>
-            </a:r>
-          </a:p>
-          <a:p>
-            <a:pPr lvl="1"/>
-            <a:r>
-              <a:rPr lang="en-US" dirty="0"/>
-              <a:t>Simulate patient arrival time</a:t>
-            </a:r>
-          </a:p>
-          <a:p>
-            <a:pPr lvl="1"/>
-            <a:r>
-              <a:rPr lang="en-US" dirty="0"/>
-              <a:t>Randomize patients</a:t>
-            </a:r>
-          </a:p>
-          <a:p>
-            <a:pPr lvl="1"/>
-            <a:r>
-              <a:rPr lang="en-US" dirty="0"/>
-              <a:t>Simulate patient outcomes</a:t>
-            </a:r>
-          </a:p>
-          <a:p>
-            <a:pPr lvl="1"/>
-            <a:r>
-              <a:rPr lang="en-US" dirty="0"/>
-              <a:t>Create a patient data set for analysis</a:t>
-            </a:r>
-          </a:p>
-          <a:p>
-            <a:pPr lvl="1"/>
-            <a:r>
-              <a:rPr lang="en-US" dirty="0"/>
-              <a:t>Run the analysis </a:t>
-            </a:r>
-          </a:p>
-          <a:p>
-            <a:pPr lvl="1"/>
-            <a:r>
-              <a:rPr lang="en-US" dirty="0"/>
-              <a:t>Make decisions regarding selecting S, E or neither</a:t>
-            </a:r>
-          </a:p>
-          <a:p>
-            <a:pPr lvl="1"/>
-            <a:r>
-              <a:rPr lang="en-US" dirty="0"/>
-              <a:t>Keep summaries over many replications</a:t>
-            </a:r>
-          </a:p>
-          <a:p>
-            <a:pPr lvl="1"/>
-            <a:endParaRPr lang="en-US" dirty="0"/>
-          </a:p>
-          <a:p>
-            <a:endParaRPr lang="en-US" dirty="0"/>
-          </a:p>
-          <a:p>
-            <a:endParaRPr lang="en-US" dirty="0"/>
-          </a:p>
-        </p:txBody>
-      </p:sp>
-      <p:sp>
-        <p:nvSpPr>
-          <p:cNvPr id="4" name="Footer Placeholder 3">
-            <a:extLst>
-              <a:ext uri="{FF2B5EF4-FFF2-40B4-BE49-F238E27FC236}">
-                <a16:creationId xmlns:a16="http://schemas.microsoft.com/office/drawing/2014/main" id="{B5C65A9A-40C8-4C35-90DE-72AA72C89A95}"/>
-              </a:ext>
-            </a:extLst>
-          </p:cNvPr>
-          <p:cNvSpPr>
-            <a:spLocks noGrp="1"/>
-          </p:cNvSpPr>
-          <p:nvPr>
-            <p:ph type="ftr" sz="quarter" idx="11"/>
-          </p:nvPr>
-        </p:nvSpPr>
-        <p:spPr/>
-        <p:txBody>
-          <a:bodyPr/>
-          <a:lstStyle/>
-          <a:p>
-            <a:r>
-              <a:rPr lang="en-US"/>
-              <a:t>ASA Biopharmaceutical Section</a:t>
-            </a:r>
-            <a:endParaRPr lang="en-US" dirty="0"/>
-          </a:p>
-        </p:txBody>
-      </p:sp>
-      <p:sp>
-        <p:nvSpPr>
-          <p:cNvPr id="5" name="Slide Number Placeholder 4">
-            <a:extLst>
-              <a:ext uri="{FF2B5EF4-FFF2-40B4-BE49-F238E27FC236}">
-                <a16:creationId xmlns:a16="http://schemas.microsoft.com/office/drawing/2014/main" id="{02741BEB-2BCB-4E4F-9291-2A6F6386A41C}"/>
-              </a:ext>
-            </a:extLst>
-          </p:cNvPr>
-          <p:cNvSpPr>
-            <a:spLocks noGrp="1"/>
-          </p:cNvSpPr>
-          <p:nvPr>
-            <p:ph type="sldNum" sz="quarter" idx="12"/>
-          </p:nvPr>
-        </p:nvSpPr>
-        <p:spPr/>
-        <p:txBody>
-          <a:bodyPr/>
-          <a:lstStyle/>
-          <a:p>
-            <a:fld id="{BFC1F633-5D42-481B-83F9-D18A18F653A2}" type="slidenum">
-              <a:rPr lang="en-US" smtClean="0"/>
-              <a:t>7</a:t>
-            </a:fld>
-            <a:endParaRPr lang="en-US" dirty="0"/>
-          </a:p>
-        </p:txBody>
-      </p:sp>
-      <p:sp>
-        <p:nvSpPr>
-          <p:cNvPr id="6" name="Date Placeholder 5">
-            <a:extLst>
-              <a:ext uri="{FF2B5EF4-FFF2-40B4-BE49-F238E27FC236}">
-                <a16:creationId xmlns:a16="http://schemas.microsoft.com/office/drawing/2014/main" id="{EFAAA2D4-B7A3-49D1-9062-0032E4BFD4A9}"/>
-              </a:ext>
-            </a:extLst>
-          </p:cNvPr>
-          <p:cNvSpPr>
-            <a:spLocks noGrp="1"/>
-          </p:cNvSpPr>
-          <p:nvPr>
-            <p:ph type="dt" sz="half" idx="10"/>
-          </p:nvPr>
-        </p:nvSpPr>
-        <p:spPr/>
-        <p:txBody>
-          <a:bodyPr/>
-          <a:lstStyle/>
-          <a:p>
-            <a:r>
-              <a:rPr lang="en-US"/>
-              <a:t>Simulating Adaptive Clinical Trials Part 2 - J. Kyle Wathen</a:t>
-            </a:r>
-            <a:endParaRPr lang="en-US" dirty="0"/>
-          </a:p>
-        </p:txBody>
-      </p:sp>
-    </p:spTree>
-    <p:extLst>
-      <p:ext uri="{BB962C8B-B14F-4D97-AF65-F5344CB8AC3E}">
-        <p14:creationId xmlns:p14="http://schemas.microsoft.com/office/powerpoint/2010/main" val="1522088205"/>
-      </p:ext>
-    </p:extLst>
-  </p:cSld>
-  <p:clrMapOvr>
-    <a:masterClrMapping/>
-  </p:clrMapOvr>
-</p:sld>
-</file>
-
-<file path=ppt/slides/slide8.xml><?xml version="1.0" encoding="utf-8"?>
-<p:sld xmlns:a="http://schemas.openxmlformats.org/drawingml/2006/main" xmlns:r="http://schemas.openxmlformats.org/officeDocument/2006/relationships" xmlns:p="http://schemas.openxmlformats.org/presentationml/2006/main">
-  <p:cSld>
-    <p:spTree>
-      <p:nvGrpSpPr>
-        <p:cNvPr id="1" name=""/>
-        <p:cNvGrpSpPr/>
-        <p:nvPr/>
-      </p:nvGrpSpPr>
-      <p:grpSpPr>
-        <a:xfrm>
-          <a:off x="0" y="0"/>
-          <a:ext cx="0" cy="0"/>
-          <a:chOff x="0" y="0"/>
-          <a:chExt cx="0" cy="0"/>
-        </a:xfrm>
-      </p:grpSpPr>
-      <p:sp>
-        <p:nvSpPr>
-          <p:cNvPr id="2" name="Title 1">
-            <a:extLst>
-              <a:ext uri="{FF2B5EF4-FFF2-40B4-BE49-F238E27FC236}">
-                <a16:creationId xmlns:a16="http://schemas.microsoft.com/office/drawing/2014/main" id="{D2785D7E-D50D-4FF7-81D9-C01264B01EFB}"/>
-              </a:ext>
-            </a:extLst>
-          </p:cNvPr>
-          <p:cNvSpPr>
-            <a:spLocks noGrp="1"/>
-          </p:cNvSpPr>
-          <p:nvPr>
-            <p:ph type="title"/>
-          </p:nvPr>
-        </p:nvSpPr>
-        <p:spPr/>
-        <p:txBody>
-          <a:bodyPr/>
-          <a:lstStyle/>
-          <a:p>
-            <a:r>
-              <a:rPr lang="en-US" dirty="0"/>
-              <a:t>Task to Function</a:t>
-            </a:r>
-          </a:p>
-        </p:txBody>
-      </p:sp>
-      <p:sp>
-        <p:nvSpPr>
-          <p:cNvPr id="3" name="Content Placeholder 2">
-            <a:extLst>
-              <a:ext uri="{FF2B5EF4-FFF2-40B4-BE49-F238E27FC236}">
-                <a16:creationId xmlns:a16="http://schemas.microsoft.com/office/drawing/2014/main" id="{940E16B1-1C64-403C-B764-A039872153FD}"/>
-              </a:ext>
-            </a:extLst>
-          </p:cNvPr>
-          <p:cNvSpPr>
-            <a:spLocks noGrp="1"/>
-          </p:cNvSpPr>
-          <p:nvPr>
-            <p:ph idx="1"/>
-          </p:nvPr>
-        </p:nvSpPr>
-        <p:spPr/>
-        <p:txBody>
-          <a:bodyPr/>
-          <a:lstStyle/>
-          <a:p>
-            <a:r>
-              <a:rPr lang="en-US" sz="3000" b="1" dirty="0"/>
-              <a:t>Simulate patient arrival time  </a:t>
-            </a:r>
-            <a:r>
-              <a:rPr lang="en-US" sz="3000" dirty="0"/>
-              <a:t>- </a:t>
-            </a:r>
-            <a:r>
-              <a:rPr lang="en-US" sz="3000" dirty="0" err="1"/>
-              <a:t>SimulateArrivalTimes</a:t>
-            </a:r>
-            <a:r>
-              <a:rPr lang="en-US" sz="3000" dirty="0"/>
-              <a:t> </a:t>
-            </a:r>
-          </a:p>
-          <a:p>
-            <a:pPr lvl="1"/>
-            <a:r>
-              <a:rPr lang="en-US" sz="2600" dirty="0"/>
-              <a:t>Description: Simulate the arrival times, according to Poisson process for each patient in the study </a:t>
-            </a:r>
-          </a:p>
-          <a:p>
-            <a:pPr lvl="1"/>
-            <a:r>
-              <a:rPr lang="en-US" sz="2600" dirty="0"/>
-              <a:t>Inputs: quantity of patients, recruitment rate</a:t>
-            </a:r>
-          </a:p>
-          <a:p>
-            <a:pPr lvl="1"/>
-            <a:r>
-              <a:rPr lang="en-US" sz="2600" dirty="0"/>
-              <a:t>Return: Vector of arrival times, length of vector = number of patients </a:t>
-            </a:r>
-          </a:p>
-          <a:p>
-            <a:pPr marL="0" indent="0">
-              <a:buNone/>
-            </a:pPr>
-            <a:endParaRPr lang="en-US" dirty="0"/>
-          </a:p>
-        </p:txBody>
-      </p:sp>
-      <p:sp>
-        <p:nvSpPr>
-          <p:cNvPr id="4" name="Footer Placeholder 3">
-            <a:extLst>
-              <a:ext uri="{FF2B5EF4-FFF2-40B4-BE49-F238E27FC236}">
-                <a16:creationId xmlns:a16="http://schemas.microsoft.com/office/drawing/2014/main" id="{5EB3447C-D041-48C7-A727-7B5CE1AF1CF7}"/>
-              </a:ext>
-            </a:extLst>
-          </p:cNvPr>
-          <p:cNvSpPr>
-            <a:spLocks noGrp="1"/>
-          </p:cNvSpPr>
-          <p:nvPr>
-            <p:ph type="ftr" sz="quarter" idx="11"/>
-          </p:nvPr>
-        </p:nvSpPr>
-        <p:spPr/>
-        <p:txBody>
-          <a:bodyPr/>
-          <a:lstStyle/>
-          <a:p>
-            <a:r>
-              <a:rPr lang="en-US"/>
-              <a:t>ASA Biopharmaceutical Section</a:t>
-            </a:r>
-            <a:endParaRPr lang="en-US" dirty="0"/>
-          </a:p>
-        </p:txBody>
-      </p:sp>
-      <p:sp>
-        <p:nvSpPr>
-          <p:cNvPr id="5" name="Slide Number Placeholder 4">
-            <a:extLst>
-              <a:ext uri="{FF2B5EF4-FFF2-40B4-BE49-F238E27FC236}">
-                <a16:creationId xmlns:a16="http://schemas.microsoft.com/office/drawing/2014/main" id="{7F7A518E-8298-4036-8C21-1891D3CCF37F}"/>
-              </a:ext>
-            </a:extLst>
-          </p:cNvPr>
-          <p:cNvSpPr>
-            <a:spLocks noGrp="1"/>
-          </p:cNvSpPr>
-          <p:nvPr>
-            <p:ph type="sldNum" sz="quarter" idx="12"/>
-          </p:nvPr>
-        </p:nvSpPr>
-        <p:spPr/>
-        <p:txBody>
-          <a:bodyPr/>
-          <a:lstStyle/>
-          <a:p>
-            <a:fld id="{BFC1F633-5D42-481B-83F9-D18A18F653A2}" type="slidenum">
-              <a:rPr lang="en-US" smtClean="0"/>
-              <a:t>8</a:t>
-            </a:fld>
-            <a:endParaRPr lang="en-US" dirty="0"/>
-          </a:p>
-        </p:txBody>
-      </p:sp>
-      <p:sp>
-        <p:nvSpPr>
-          <p:cNvPr id="6" name="Date Placeholder 5">
-            <a:extLst>
-              <a:ext uri="{FF2B5EF4-FFF2-40B4-BE49-F238E27FC236}">
-                <a16:creationId xmlns:a16="http://schemas.microsoft.com/office/drawing/2014/main" id="{A4BF5160-6FAB-4375-8483-6E83AD2D9E24}"/>
-              </a:ext>
-            </a:extLst>
-          </p:cNvPr>
-          <p:cNvSpPr>
-            <a:spLocks noGrp="1"/>
-          </p:cNvSpPr>
-          <p:nvPr>
-            <p:ph type="dt" sz="half" idx="10"/>
-          </p:nvPr>
-        </p:nvSpPr>
-        <p:spPr/>
-        <p:txBody>
-          <a:bodyPr/>
-          <a:lstStyle/>
-          <a:p>
-            <a:r>
-              <a:rPr lang="en-US"/>
-              <a:t>Simulating Adaptive Clinical Trials Part 2 - J. Kyle Wathen</a:t>
-            </a:r>
-            <a:endParaRPr lang="en-US" dirty="0"/>
-          </a:p>
-        </p:txBody>
-      </p:sp>
-    </p:spTree>
-    <p:extLst>
-      <p:ext uri="{BB962C8B-B14F-4D97-AF65-F5344CB8AC3E}">
-        <p14:creationId xmlns:p14="http://schemas.microsoft.com/office/powerpoint/2010/main" val="4036946819"/>
-      </p:ext>
-    </p:extLst>
-  </p:cSld>
-  <p:clrMapOvr>
-    <a:masterClrMapping/>
-  </p:clrMapOvr>
-</p:sld>
-</file>
-
-<file path=ppt/slides/slide9.xml><?xml version="1.0" encoding="utf-8"?>
-<p:sld xmlns:a="http://schemas.openxmlformats.org/drawingml/2006/main" xmlns:r="http://schemas.openxmlformats.org/officeDocument/2006/relationships" xmlns:p="http://schemas.openxmlformats.org/presentationml/2006/main">
-  <p:cSld>
-    <p:spTree>
-      <p:nvGrpSpPr>
-        <p:cNvPr id="1" name=""/>
-        <p:cNvGrpSpPr/>
-        <p:nvPr/>
-      </p:nvGrpSpPr>
-      <p:grpSpPr>
-        <a:xfrm>
-          <a:off x="0" y="0"/>
-          <a:ext cx="0" cy="0"/>
-          <a:chOff x="0" y="0"/>
-          <a:chExt cx="0" cy="0"/>
-        </a:xfrm>
-      </p:grpSpPr>
-      <p:sp>
-        <p:nvSpPr>
-          <p:cNvPr id="2" name="Title 1">
-            <a:extLst>
-              <a:ext uri="{FF2B5EF4-FFF2-40B4-BE49-F238E27FC236}">
-                <a16:creationId xmlns:a16="http://schemas.microsoft.com/office/drawing/2014/main" id="{05554E5D-34D4-4EAF-AE3B-62A06C8BCF9F}"/>
-              </a:ext>
-            </a:extLst>
-          </p:cNvPr>
-          <p:cNvSpPr>
-            <a:spLocks noGrp="1"/>
-          </p:cNvSpPr>
-          <p:nvPr>
-            <p:ph type="title"/>
-          </p:nvPr>
-        </p:nvSpPr>
-        <p:spPr/>
-        <p:txBody>
-          <a:bodyPr/>
-          <a:lstStyle/>
-          <a:p>
-            <a:r>
-              <a:rPr lang="en-US" dirty="0"/>
-              <a:t>Task to Function</a:t>
-            </a:r>
-          </a:p>
-        </p:txBody>
-      </p:sp>
-      <p:sp>
-        <p:nvSpPr>
-          <p:cNvPr id="3" name="Content Placeholder 2">
-            <a:extLst>
-              <a:ext uri="{FF2B5EF4-FFF2-40B4-BE49-F238E27FC236}">
-                <a16:creationId xmlns:a16="http://schemas.microsoft.com/office/drawing/2014/main" id="{39401D1C-427A-4B6C-94F0-AF7F6E9D31CD}"/>
-              </a:ext>
-            </a:extLst>
-          </p:cNvPr>
-          <p:cNvSpPr>
-            <a:spLocks noGrp="1"/>
-          </p:cNvSpPr>
-          <p:nvPr>
-            <p:ph idx="1"/>
-          </p:nvPr>
-        </p:nvSpPr>
-        <p:spPr/>
-        <p:txBody>
-          <a:bodyPr/>
-          <a:lstStyle/>
-          <a:p>
-            <a:r>
-              <a:rPr lang="en-US" sz="3000" b="1" dirty="0"/>
-              <a:t>Randomize patients </a:t>
-            </a:r>
-            <a:r>
-              <a:rPr lang="en-US" sz="3000" dirty="0"/>
-              <a:t>- </a:t>
-            </a:r>
-            <a:r>
-              <a:rPr lang="en-US" sz="3000" dirty="0" err="1"/>
-              <a:t>GetTreatment</a:t>
-            </a:r>
-            <a:endParaRPr lang="en-US" sz="3000" dirty="0"/>
-          </a:p>
-          <a:p>
-            <a:pPr lvl="1"/>
-            <a:r>
-              <a:rPr lang="en-US" sz="2600" dirty="0"/>
-              <a:t>Description: Determine which treatment a patient receives, called for each patient since we are planning on adaptive randomization (AR) where the data and hence randomization probability could change for each patient</a:t>
-            </a:r>
-          </a:p>
-          <a:p>
-            <a:pPr lvl="1"/>
-            <a:r>
-              <a:rPr lang="en-US" sz="2600" dirty="0"/>
-              <a:t>Input: Randomization probability  </a:t>
-            </a:r>
-          </a:p>
-          <a:p>
-            <a:pPr lvl="1"/>
-            <a:r>
-              <a:rPr lang="en-US" sz="2600" dirty="0"/>
-              <a:t>Return: the treatment for the patient where 1 indicates the patient received E and 0 indicates S</a:t>
-            </a:r>
-          </a:p>
-          <a:p>
-            <a:endParaRPr lang="en-US" dirty="0"/>
-          </a:p>
-        </p:txBody>
-      </p:sp>
-      <p:sp>
-        <p:nvSpPr>
-          <p:cNvPr id="4" name="Footer Placeholder 3">
-            <a:extLst>
-              <a:ext uri="{FF2B5EF4-FFF2-40B4-BE49-F238E27FC236}">
-                <a16:creationId xmlns:a16="http://schemas.microsoft.com/office/drawing/2014/main" id="{70C718A3-C8AE-48D8-939B-C71D89438895}"/>
-              </a:ext>
-            </a:extLst>
-          </p:cNvPr>
-          <p:cNvSpPr>
-            <a:spLocks noGrp="1"/>
-          </p:cNvSpPr>
-          <p:nvPr>
-            <p:ph type="ftr" sz="quarter" idx="11"/>
-          </p:nvPr>
-        </p:nvSpPr>
-        <p:spPr/>
-        <p:txBody>
-          <a:bodyPr/>
-          <a:lstStyle/>
-          <a:p>
-            <a:r>
-              <a:rPr lang="en-US"/>
-              <a:t>ASA Biopharmaceutical Section</a:t>
-            </a:r>
-            <a:endParaRPr lang="en-US" dirty="0"/>
-          </a:p>
-        </p:txBody>
-      </p:sp>
-      <p:sp>
-        <p:nvSpPr>
-          <p:cNvPr id="5" name="Slide Number Placeholder 4">
-            <a:extLst>
-              <a:ext uri="{FF2B5EF4-FFF2-40B4-BE49-F238E27FC236}">
-                <a16:creationId xmlns:a16="http://schemas.microsoft.com/office/drawing/2014/main" id="{65969944-5A8E-4A3B-B983-441F7BAB5248}"/>
-              </a:ext>
-            </a:extLst>
-          </p:cNvPr>
-          <p:cNvSpPr>
-            <a:spLocks noGrp="1"/>
-          </p:cNvSpPr>
-          <p:nvPr>
-            <p:ph type="sldNum" sz="quarter" idx="12"/>
-          </p:nvPr>
-        </p:nvSpPr>
-        <p:spPr/>
-        <p:txBody>
-          <a:bodyPr/>
-          <a:lstStyle/>
-          <a:p>
-            <a:fld id="{BFC1F633-5D42-481B-83F9-D18A18F653A2}" type="slidenum">
-              <a:rPr lang="en-US" smtClean="0"/>
-              <a:t>9</a:t>
-            </a:fld>
-            <a:endParaRPr lang="en-US" dirty="0"/>
-          </a:p>
-        </p:txBody>
-      </p:sp>
-      <p:sp>
-        <p:nvSpPr>
-          <p:cNvPr id="6" name="Date Placeholder 5">
-            <a:extLst>
-              <a:ext uri="{FF2B5EF4-FFF2-40B4-BE49-F238E27FC236}">
-                <a16:creationId xmlns:a16="http://schemas.microsoft.com/office/drawing/2014/main" id="{8C1008C3-72F3-4694-9204-BB08334961C2}"/>
-              </a:ext>
-            </a:extLst>
-          </p:cNvPr>
-          <p:cNvSpPr>
-            <a:spLocks noGrp="1"/>
-          </p:cNvSpPr>
-          <p:nvPr>
-            <p:ph type="dt" sz="half" idx="10"/>
-          </p:nvPr>
-        </p:nvSpPr>
-        <p:spPr/>
-        <p:txBody>
-          <a:bodyPr/>
-          <a:lstStyle/>
-          <a:p>
-            <a:r>
-              <a:rPr lang="en-US"/>
-              <a:t>Simulating Adaptive Clinical Trials Part 2 - J. Kyle Wathen</a:t>
-            </a:r>
-            <a:endParaRPr lang="en-US" dirty="0"/>
-          </a:p>
-        </p:txBody>
-      </p:sp>
-    </p:spTree>
-    <p:extLst>
-      <p:ext uri="{BB962C8B-B14F-4D97-AF65-F5344CB8AC3E}">
-        <p14:creationId xmlns:p14="http://schemas.microsoft.com/office/powerpoint/2010/main" val="4189263190"/>
       </p:ext>
     </p:extLst>
   </p:cSld>

</xml_diff>